<commit_message>
Updtae schema technique commit n°2
</commit_message>
<xml_diff>
--- a/caractéristiques_techniques.pptx
+++ b/caractéristiques_techniques.pptx
@@ -7,6 +7,10 @@
   <p:sldIdLst>
     <p:sldId id="256" r:id="rId2"/>
     <p:sldId id="257" r:id="rId3"/>
+    <p:sldId id="259" r:id="rId4"/>
+    <p:sldId id="260" r:id="rId5"/>
+    <p:sldId id="261" r:id="rId6"/>
+    <p:sldId id="258" r:id="rId7"/>
   </p:sldIdLst>
   <p:sldSz cx="12192000" cy="6858000"/>
   <p:notesSz cx="6858000" cy="9144000"/>
@@ -105,6 +109,11 @@
       </a:defRPr>
     </a:lvl9pPr>
   </p:defaultTextStyle>
+  <p:extLst>
+    <p:ext uri="{EFAFB233-063F-42B5-8137-9DF3F51BA10A}">
+      <p15:sldGuideLst xmlns:p15="http://schemas.microsoft.com/office/powerpoint/2012/main"/>
+    </p:ext>
+  </p:extLst>
 </p:presentation>
 </file>
 
@@ -255,7 +264,7 @@
           <a:p>
             <a:fld id="{9BC60C10-E03E-48A1-B538-E36935D0E394}" type="datetimeFigureOut">
               <a:rPr lang="fr-FR" smtClean="0"/>
-              <a:t>06/07/2023</a:t>
+              <a:t>07/07/2023</a:t>
             </a:fld>
             <a:endParaRPr lang="fr-FR"/>
           </a:p>
@@ -453,7 +462,7 @@
           <a:p>
             <a:fld id="{9BC60C10-E03E-48A1-B538-E36935D0E394}" type="datetimeFigureOut">
               <a:rPr lang="fr-FR" smtClean="0"/>
-              <a:t>06/07/2023</a:t>
+              <a:t>07/07/2023</a:t>
             </a:fld>
             <a:endParaRPr lang="fr-FR"/>
           </a:p>
@@ -661,7 +670,7 @@
           <a:p>
             <a:fld id="{9BC60C10-E03E-48A1-B538-E36935D0E394}" type="datetimeFigureOut">
               <a:rPr lang="fr-FR" smtClean="0"/>
-              <a:t>06/07/2023</a:t>
+              <a:t>07/07/2023</a:t>
             </a:fld>
             <a:endParaRPr lang="fr-FR"/>
           </a:p>
@@ -859,7 +868,7 @@
           <a:p>
             <a:fld id="{9BC60C10-E03E-48A1-B538-E36935D0E394}" type="datetimeFigureOut">
               <a:rPr lang="fr-FR" smtClean="0"/>
-              <a:t>06/07/2023</a:t>
+              <a:t>07/07/2023</a:t>
             </a:fld>
             <a:endParaRPr lang="fr-FR"/>
           </a:p>
@@ -1134,7 +1143,7 @@
           <a:p>
             <a:fld id="{9BC60C10-E03E-48A1-B538-E36935D0E394}" type="datetimeFigureOut">
               <a:rPr lang="fr-FR" smtClean="0"/>
-              <a:t>06/07/2023</a:t>
+              <a:t>07/07/2023</a:t>
             </a:fld>
             <a:endParaRPr lang="fr-FR"/>
           </a:p>
@@ -1399,7 +1408,7 @@
           <a:p>
             <a:fld id="{9BC60C10-E03E-48A1-B538-E36935D0E394}" type="datetimeFigureOut">
               <a:rPr lang="fr-FR" smtClean="0"/>
-              <a:t>06/07/2023</a:t>
+              <a:t>07/07/2023</a:t>
             </a:fld>
             <a:endParaRPr lang="fr-FR"/>
           </a:p>
@@ -1811,7 +1820,7 @@
           <a:p>
             <a:fld id="{9BC60C10-E03E-48A1-B538-E36935D0E394}" type="datetimeFigureOut">
               <a:rPr lang="fr-FR" smtClean="0"/>
-              <a:t>06/07/2023</a:t>
+              <a:t>07/07/2023</a:t>
             </a:fld>
             <a:endParaRPr lang="fr-FR"/>
           </a:p>
@@ -1952,7 +1961,7 @@
           <a:p>
             <a:fld id="{9BC60C10-E03E-48A1-B538-E36935D0E394}" type="datetimeFigureOut">
               <a:rPr lang="fr-FR" smtClean="0"/>
-              <a:t>06/07/2023</a:t>
+              <a:t>07/07/2023</a:t>
             </a:fld>
             <a:endParaRPr lang="fr-FR"/>
           </a:p>
@@ -2065,7 +2074,7 @@
           <a:p>
             <a:fld id="{9BC60C10-E03E-48A1-B538-E36935D0E394}" type="datetimeFigureOut">
               <a:rPr lang="fr-FR" smtClean="0"/>
-              <a:t>06/07/2023</a:t>
+              <a:t>07/07/2023</a:t>
             </a:fld>
             <a:endParaRPr lang="fr-FR"/>
           </a:p>
@@ -2376,7 +2385,7 @@
           <a:p>
             <a:fld id="{9BC60C10-E03E-48A1-B538-E36935D0E394}" type="datetimeFigureOut">
               <a:rPr lang="fr-FR" smtClean="0"/>
-              <a:t>06/07/2023</a:t>
+              <a:t>07/07/2023</a:t>
             </a:fld>
             <a:endParaRPr lang="fr-FR"/>
           </a:p>
@@ -2664,7 +2673,7 @@
           <a:p>
             <a:fld id="{9BC60C10-E03E-48A1-B538-E36935D0E394}" type="datetimeFigureOut">
               <a:rPr lang="fr-FR" smtClean="0"/>
-              <a:t>06/07/2023</a:t>
+              <a:t>07/07/2023</a:t>
             </a:fld>
             <a:endParaRPr lang="fr-FR"/>
           </a:p>
@@ -2905,7 +2914,7 @@
           <a:p>
             <a:fld id="{9BC60C10-E03E-48A1-B538-E36935D0E394}" type="datetimeFigureOut">
               <a:rPr lang="fr-FR" smtClean="0"/>
-              <a:t>06/07/2023</a:t>
+              <a:t>07/07/2023</a:t>
             </a:fld>
             <a:endParaRPr lang="fr-FR"/>
           </a:p>
@@ -3409,31 +3418,6 @@
       </p:grpSpPr>
       <p:sp>
         <p:nvSpPr>
-          <p:cNvPr id="2" name="Titre 1">
-            <a:extLst>
-              <a:ext uri="{FF2B5EF4-FFF2-40B4-BE49-F238E27FC236}">
-                <a16:creationId xmlns:a16="http://schemas.microsoft.com/office/drawing/2014/main" id="{50856028-B3C3-0380-C856-8586E3393B6D}"/>
-              </a:ext>
-            </a:extLst>
-          </p:cNvPr>
-          <p:cNvSpPr>
-            <a:spLocks noGrp="1"/>
-          </p:cNvSpPr>
-          <p:nvPr>
-            <p:ph type="title"/>
-          </p:nvPr>
-        </p:nvSpPr>
-        <p:spPr/>
-        <p:txBody>
-          <a:bodyPr/>
-          <a:lstStyle/>
-          <a:p>
-            <a:endParaRPr lang="fr-FR"/>
-          </a:p>
-        </p:txBody>
-      </p:sp>
-      <p:sp>
-        <p:nvSpPr>
           <p:cNvPr id="3" name="Espace réservé du contenu 2">
             <a:extLst>
               <a:ext uri="{FF2B5EF4-FFF2-40B4-BE49-F238E27FC236}">
@@ -3448,12 +3432,145 @@
             <p:ph idx="1"/>
           </p:nvPr>
         </p:nvSpPr>
-        <p:spPr/>
-        <p:txBody>
-          <a:bodyPr/>
-          <a:lstStyle/>
-          <a:p>
-            <a:endParaRPr lang="fr-FR"/>
+        <p:spPr>
+          <a:xfrm>
+            <a:off x="758301" y="369687"/>
+            <a:ext cx="10515600" cy="4351338"/>
+          </a:xfrm>
+        </p:spPr>
+        <p:txBody>
+          <a:bodyPr>
+            <a:normAutofit/>
+          </a:bodyPr>
+          <a:lstStyle/>
+          <a:p>
+            <a:pPr marL="0" indent="0">
+              <a:buNone/>
+            </a:pPr>
+            <a:r>
+              <a:rPr lang="fr-FR" sz="1600" u="sng" dirty="0"/>
+              <a:t>Les Classes</a:t>
+            </a:r>
+          </a:p>
+          <a:p>
+            <a:pPr marL="0" indent="0">
+              <a:buNone/>
+            </a:pPr>
+            <a:r>
+              <a:rPr lang="fr-FR" sz="1600" dirty="0"/>
+              <a:t>Game &gt; gestion de la partie, crée des objets Round jusqu’à la fin de la partie,</a:t>
+            </a:r>
+          </a:p>
+          <a:p>
+            <a:pPr marL="0" indent="0">
+              <a:buNone/>
+            </a:pPr>
+            <a:r>
+              <a:rPr lang="fr-FR" sz="1600" dirty="0"/>
+              <a:t>Round &gt; gestion d’un round, crée des objets </a:t>
+            </a:r>
+            <a:r>
+              <a:rPr lang="fr-FR" sz="1600" dirty="0" err="1"/>
+              <a:t>Step</a:t>
+            </a:r>
+            <a:r>
+              <a:rPr lang="fr-FR" sz="1600" dirty="0"/>
+              <a:t> jusqu’à la fin d’un round</a:t>
+            </a:r>
+          </a:p>
+          <a:p>
+            <a:pPr marL="0" indent="0">
+              <a:buNone/>
+            </a:pPr>
+            <a:r>
+              <a:rPr lang="fr-FR" sz="1600" dirty="0" err="1"/>
+              <a:t>Step</a:t>
+            </a:r>
+            <a:r>
+              <a:rPr lang="fr-FR" sz="1600" dirty="0"/>
+              <a:t> &gt; phase de jeu, </a:t>
+            </a:r>
+            <a:r>
+              <a:rPr lang="fr-FR" sz="1600" dirty="0" err="1"/>
+              <a:t>definie</a:t>
+            </a:r>
+            <a:r>
+              <a:rPr lang="fr-FR" sz="1600" dirty="0"/>
+              <a:t> comme [tour préliminaire, flop, </a:t>
+            </a:r>
+            <a:r>
+              <a:rPr lang="fr-FR" sz="1600" dirty="0" err="1"/>
+              <a:t>turn</a:t>
+            </a:r>
+            <a:r>
+              <a:rPr lang="fr-FR" sz="1600" dirty="0"/>
+              <a:t>, river] instancie des envois de paquets et autres fonctions.</a:t>
+            </a:r>
+          </a:p>
+          <a:p>
+            <a:pPr marL="0" indent="0">
+              <a:buNone/>
+            </a:pPr>
+            <a:r>
+              <a:rPr lang="fr-FR" sz="1600" dirty="0"/>
+              <a:t>Player&gt; objet créé par la fonction main à la connexion d’une machine</a:t>
+            </a:r>
+          </a:p>
+          <a:p>
+            <a:pPr marL="0" indent="0">
+              <a:buNone/>
+            </a:pPr>
+            <a:r>
+              <a:rPr lang="fr-FR" sz="1600" dirty="0" err="1"/>
+              <a:t>Card</a:t>
+            </a:r>
+            <a:r>
+              <a:rPr lang="fr-FR" sz="1600" dirty="0"/>
+              <a:t> &gt; objet constant représentant une carte</a:t>
+            </a:r>
+          </a:p>
+          <a:p>
+            <a:pPr marL="0" indent="0">
+              <a:buNone/>
+            </a:pPr>
+            <a:r>
+              <a:rPr lang="fr-FR" sz="1600" dirty="0"/>
+              <a:t>Hand &gt; objet représentant une main constituée de cartes</a:t>
+            </a:r>
+          </a:p>
+          <a:p>
+            <a:pPr marL="0" indent="0">
+              <a:buNone/>
+            </a:pPr>
+            <a:r>
+              <a:rPr lang="fr-FR" sz="1600" dirty="0"/>
+              <a:t>Deck &gt; objet représentant un </a:t>
+            </a:r>
+            <a:r>
+              <a:rPr lang="fr-FR" sz="1600" dirty="0" err="1"/>
+              <a:t>packet</a:t>
+            </a:r>
+            <a:r>
+              <a:rPr lang="fr-FR" sz="1600" dirty="0"/>
+              <a:t> de 52 cartes classique</a:t>
+            </a:r>
+          </a:p>
+          <a:p>
+            <a:pPr marL="0" indent="0">
+              <a:buNone/>
+            </a:pPr>
+            <a:r>
+              <a:rPr lang="fr-FR" sz="1600" dirty="0"/>
+              <a:t>Lobby &gt; objet représentant un lobby avant une </a:t>
+            </a:r>
+            <a:r>
+              <a:rPr lang="fr-FR" sz="1600" dirty="0" err="1"/>
+              <a:t>game</a:t>
+            </a:r>
+            <a:r>
+              <a:rPr lang="fr-FR" sz="1600" dirty="0"/>
+              <a:t>, instancié par main.</a:t>
+            </a:r>
           </a:p>
         </p:txBody>
       </p:sp>
@@ -3461,6 +3578,723 @@
     <p:extLst>
       <p:ext uri="{BB962C8B-B14F-4D97-AF65-F5344CB8AC3E}">
         <p14:creationId xmlns:p14="http://schemas.microsoft.com/office/powerpoint/2010/main" val="307857995"/>
+      </p:ext>
+    </p:extLst>
+  </p:cSld>
+  <p:clrMapOvr>
+    <a:masterClrMapping/>
+  </p:clrMapOvr>
+</p:sld>
+</file>
+
+<file path=ppt/slides/slide3.xml><?xml version="1.0" encoding="utf-8"?>
+<p:sld xmlns:a="http://schemas.openxmlformats.org/drawingml/2006/main" xmlns:r="http://schemas.openxmlformats.org/officeDocument/2006/relationships" xmlns:p="http://schemas.openxmlformats.org/presentationml/2006/main">
+  <p:cSld>
+    <p:spTree>
+      <p:nvGrpSpPr>
+        <p:cNvPr id="1" name=""/>
+        <p:cNvGrpSpPr/>
+        <p:nvPr/>
+      </p:nvGrpSpPr>
+      <p:grpSpPr>
+        <a:xfrm>
+          <a:off x="0" y="0"/>
+          <a:ext cx="0" cy="0"/>
+          <a:chOff x="0" y="0"/>
+          <a:chExt cx="0" cy="0"/>
+        </a:xfrm>
+      </p:grpSpPr>
+      <p:sp>
+        <p:nvSpPr>
+          <p:cNvPr id="3" name="Espace réservé du contenu 2">
+            <a:extLst>
+              <a:ext uri="{FF2B5EF4-FFF2-40B4-BE49-F238E27FC236}">
+                <a16:creationId xmlns:a16="http://schemas.microsoft.com/office/drawing/2014/main" id="{B631B836-07E9-4B6D-BBAF-1E48BE6C36FB}"/>
+              </a:ext>
+            </a:extLst>
+          </p:cNvPr>
+          <p:cNvSpPr>
+            <a:spLocks noGrp="1"/>
+          </p:cNvSpPr>
+          <p:nvPr>
+            <p:ph idx="1"/>
+          </p:nvPr>
+        </p:nvSpPr>
+        <p:spPr>
+          <a:xfrm>
+            <a:off x="749423" y="440708"/>
+            <a:ext cx="10515600" cy="4351338"/>
+          </a:xfrm>
+        </p:spPr>
+        <p:txBody>
+          <a:bodyPr>
+            <a:normAutofit/>
+          </a:bodyPr>
+          <a:lstStyle/>
+          <a:p>
+            <a:r>
+              <a:rPr lang="fr-FR" sz="1600" u="sng" dirty="0"/>
+              <a:t>Class Player :</a:t>
+            </a:r>
+          </a:p>
+          <a:p>
+            <a:pPr marL="0" indent="0">
+              <a:buNone/>
+            </a:pPr>
+            <a:r>
+              <a:rPr lang="fr-FR" sz="1600" u="sng" dirty="0"/>
+              <a:t>Attributs</a:t>
+            </a:r>
+            <a:r>
+              <a:rPr lang="fr-FR" sz="1600" dirty="0"/>
+              <a:t> :</a:t>
+            </a:r>
+          </a:p>
+          <a:p>
+            <a:pPr marL="0" indent="0">
+              <a:buNone/>
+            </a:pPr>
+            <a:r>
+              <a:rPr lang="fr-FR" sz="1600" dirty="0"/>
+              <a:t>self.id	   : </a:t>
+            </a:r>
+            <a:r>
+              <a:rPr lang="fr-FR" sz="1600" dirty="0" err="1"/>
+              <a:t>int</a:t>
+            </a:r>
+            <a:endParaRPr lang="fr-FR" sz="1600" dirty="0"/>
+          </a:p>
+          <a:p>
+            <a:pPr marL="0" indent="0">
+              <a:buNone/>
+            </a:pPr>
+            <a:r>
+              <a:rPr lang="fr-FR" sz="1600" dirty="0" err="1"/>
+              <a:t>self.conn</a:t>
+            </a:r>
+            <a:r>
+              <a:rPr lang="fr-FR" sz="1600" dirty="0"/>
+              <a:t>       : socket</a:t>
+            </a:r>
+          </a:p>
+          <a:p>
+            <a:pPr marL="0" indent="0">
+              <a:buNone/>
+            </a:pPr>
+            <a:r>
+              <a:rPr lang="fr-FR" sz="1600" dirty="0"/>
+              <a:t>self.pseudo   : </a:t>
+            </a:r>
+            <a:r>
+              <a:rPr lang="fr-FR" sz="1600" dirty="0" err="1"/>
+              <a:t>str</a:t>
+            </a:r>
+            <a:endParaRPr lang="fr-FR" sz="1600" dirty="0"/>
+          </a:p>
+          <a:p>
+            <a:pPr marL="0" indent="0">
+              <a:buNone/>
+            </a:pPr>
+            <a:r>
+              <a:rPr lang="fr-FR" sz="1600" dirty="0"/>
+              <a:t>self.is_alive   : </a:t>
+            </a:r>
+            <a:r>
+              <a:rPr lang="fr-FR" sz="1600" dirty="0" err="1"/>
+              <a:t>bool</a:t>
+            </a:r>
+            <a:endParaRPr lang="fr-FR" sz="1600" dirty="0"/>
+          </a:p>
+          <a:p>
+            <a:pPr marL="0" indent="0">
+              <a:buNone/>
+            </a:pPr>
+            <a:r>
+              <a:rPr lang="fr-FR" sz="1600" dirty="0" err="1"/>
+              <a:t>self.chips</a:t>
+            </a:r>
+            <a:r>
+              <a:rPr lang="fr-FR" sz="1600" dirty="0"/>
+              <a:t>       : </a:t>
+            </a:r>
+            <a:r>
+              <a:rPr lang="fr-FR" sz="1600" dirty="0" err="1"/>
+              <a:t>int</a:t>
+            </a:r>
+            <a:endParaRPr lang="fr-FR" sz="1600" dirty="0"/>
+          </a:p>
+          <a:p>
+            <a:pPr marL="0" indent="0">
+              <a:buNone/>
+            </a:pPr>
+            <a:r>
+              <a:rPr lang="fr-FR" sz="1600" dirty="0" err="1"/>
+              <a:t>self.hand</a:t>
+            </a:r>
+            <a:r>
+              <a:rPr lang="fr-FR" sz="1600" dirty="0"/>
+              <a:t>       : Hand</a:t>
+            </a:r>
+          </a:p>
+          <a:p>
+            <a:pPr marL="0" indent="0">
+              <a:buNone/>
+            </a:pPr>
+            <a:endParaRPr lang="fr-FR" sz="1600" dirty="0"/>
+          </a:p>
+        </p:txBody>
+      </p:sp>
+    </p:spTree>
+    <p:extLst>
+      <p:ext uri="{BB962C8B-B14F-4D97-AF65-F5344CB8AC3E}">
+        <p14:creationId xmlns:p14="http://schemas.microsoft.com/office/powerpoint/2010/main" val="2502632550"/>
+      </p:ext>
+    </p:extLst>
+  </p:cSld>
+  <p:clrMapOvr>
+    <a:masterClrMapping/>
+  </p:clrMapOvr>
+</p:sld>
+</file>
+
+<file path=ppt/slides/slide4.xml><?xml version="1.0" encoding="utf-8"?>
+<p:sld xmlns:a="http://schemas.openxmlformats.org/drawingml/2006/main" xmlns:r="http://schemas.openxmlformats.org/officeDocument/2006/relationships" xmlns:p="http://schemas.openxmlformats.org/presentationml/2006/main">
+  <p:cSld>
+    <p:spTree>
+      <p:nvGrpSpPr>
+        <p:cNvPr id="1" name=""/>
+        <p:cNvGrpSpPr/>
+        <p:nvPr/>
+      </p:nvGrpSpPr>
+      <p:grpSpPr>
+        <a:xfrm>
+          <a:off x="0" y="0"/>
+          <a:ext cx="0" cy="0"/>
+          <a:chOff x="0" y="0"/>
+          <a:chExt cx="0" cy="0"/>
+        </a:xfrm>
+      </p:grpSpPr>
+      <p:sp>
+        <p:nvSpPr>
+          <p:cNvPr id="3" name="Espace réservé du contenu 2">
+            <a:extLst>
+              <a:ext uri="{FF2B5EF4-FFF2-40B4-BE49-F238E27FC236}">
+                <a16:creationId xmlns:a16="http://schemas.microsoft.com/office/drawing/2014/main" id="{7BD1CE48-7BD0-8890-B1CB-F50856133CF0}"/>
+              </a:ext>
+            </a:extLst>
+          </p:cNvPr>
+          <p:cNvSpPr>
+            <a:spLocks noGrp="1"/>
+          </p:cNvSpPr>
+          <p:nvPr>
+            <p:ph idx="1"/>
+          </p:nvPr>
+        </p:nvSpPr>
+        <p:spPr>
+          <a:xfrm>
+            <a:off x="740546" y="245400"/>
+            <a:ext cx="10515600" cy="4351338"/>
+          </a:xfrm>
+        </p:spPr>
+        <p:txBody>
+          <a:bodyPr>
+            <a:normAutofit/>
+          </a:bodyPr>
+          <a:lstStyle/>
+          <a:p>
+            <a:r>
+              <a:rPr lang="fr-FR" sz="1600" u="sng" dirty="0"/>
+              <a:t>Class </a:t>
+            </a:r>
+            <a:r>
+              <a:rPr lang="fr-FR" sz="1600" u="sng" dirty="0" err="1"/>
+              <a:t>Card</a:t>
+            </a:r>
+            <a:r>
+              <a:rPr lang="fr-FR" sz="1600" u="sng" dirty="0"/>
+              <a:t> :</a:t>
+            </a:r>
+          </a:p>
+          <a:p>
+            <a:pPr marL="0" indent="0">
+              <a:buNone/>
+            </a:pPr>
+            <a:r>
+              <a:rPr lang="fr-FR" sz="1600" u="sng" dirty="0"/>
+              <a:t>Attributs :</a:t>
+            </a:r>
+          </a:p>
+          <a:p>
+            <a:pPr marL="0" indent="0">
+              <a:buNone/>
+            </a:pPr>
+            <a:r>
+              <a:rPr lang="fr-FR" sz="1600" dirty="0" err="1"/>
+              <a:t>self.suit</a:t>
+            </a:r>
+            <a:r>
+              <a:rPr lang="fr-FR" sz="1600" dirty="0"/>
+              <a:t> (</a:t>
+            </a:r>
+            <a:r>
+              <a:rPr lang="en-US" sz="1100" b="0" i="0" dirty="0">
+                <a:solidFill>
+                  <a:srgbClr val="040C28"/>
+                </a:solidFill>
+                <a:effectLst/>
+                <a:latin typeface="Google Sans"/>
+              </a:rPr>
+              <a:t>spade”, “club”, “heart” or “diamond”</a:t>
+            </a:r>
+            <a:r>
+              <a:rPr lang="fr-FR" sz="1600" dirty="0"/>
+              <a:t>)</a:t>
+            </a:r>
+            <a:r>
+              <a:rPr lang="fr-FR" sz="1200" dirty="0"/>
+              <a:t> </a:t>
+            </a:r>
+            <a:r>
+              <a:rPr lang="fr-FR" sz="1600" dirty="0"/>
+              <a:t>: </a:t>
+            </a:r>
+            <a:r>
+              <a:rPr lang="fr-FR" sz="1600" dirty="0" err="1"/>
+              <a:t>str</a:t>
+            </a:r>
+            <a:r>
+              <a:rPr lang="fr-FR" sz="1600" dirty="0"/>
+              <a:t> 		 </a:t>
+            </a:r>
+            <a:r>
+              <a:rPr lang="fr-FR" sz="1200" dirty="0"/>
+              <a:t>//pique </a:t>
+            </a:r>
+            <a:r>
+              <a:rPr lang="fr-FR" sz="1200" dirty="0" err="1"/>
+              <a:t>trefle</a:t>
+            </a:r>
+            <a:r>
+              <a:rPr lang="fr-FR" sz="1200" dirty="0"/>
+              <a:t> cœur carreau </a:t>
+            </a:r>
+            <a:endParaRPr lang="fr-FR" sz="1600" dirty="0"/>
+          </a:p>
+          <a:p>
+            <a:pPr marL="0" indent="0">
+              <a:buNone/>
+            </a:pPr>
+            <a:r>
+              <a:rPr lang="fr-FR" sz="1600" err="1"/>
+              <a:t>self</a:t>
+            </a:r>
+            <a:r>
+              <a:rPr lang="fr-FR" sz="1600"/>
+              <a:t>.rank</a:t>
+            </a:r>
+            <a:r>
+              <a:rPr lang="fr-FR" sz="1200"/>
+              <a:t>(«</a:t>
+            </a:r>
+            <a:r>
+              <a:rPr lang="fr-FR" sz="1200" dirty="0"/>
+              <a:t>ace,2,3,4,5,6,7,8,9,10,jack,queen,king  ») </a:t>
+            </a:r>
+            <a:r>
+              <a:rPr lang="fr-FR" sz="1600" dirty="0"/>
+              <a:t> : </a:t>
+            </a:r>
+            <a:r>
+              <a:rPr lang="fr-FR" sz="1600" dirty="0" err="1"/>
+              <a:t>str</a:t>
+            </a:r>
+            <a:endParaRPr lang="fr-FR" sz="1600" dirty="0"/>
+          </a:p>
+          <a:p>
+            <a:pPr marL="0" indent="0">
+              <a:buNone/>
+            </a:pPr>
+            <a:endParaRPr lang="fr-FR" sz="1600" dirty="0"/>
+          </a:p>
+        </p:txBody>
+      </p:sp>
+    </p:spTree>
+    <p:extLst>
+      <p:ext uri="{BB962C8B-B14F-4D97-AF65-F5344CB8AC3E}">
+        <p14:creationId xmlns:p14="http://schemas.microsoft.com/office/powerpoint/2010/main" val="1981188414"/>
+      </p:ext>
+    </p:extLst>
+  </p:cSld>
+  <p:clrMapOvr>
+    <a:masterClrMapping/>
+  </p:clrMapOvr>
+</p:sld>
+</file>
+
+<file path=ppt/slides/slide5.xml><?xml version="1.0" encoding="utf-8"?>
+<p:sld xmlns:a="http://schemas.openxmlformats.org/drawingml/2006/main" xmlns:r="http://schemas.openxmlformats.org/officeDocument/2006/relationships" xmlns:p="http://schemas.openxmlformats.org/presentationml/2006/main">
+  <p:cSld>
+    <p:spTree>
+      <p:nvGrpSpPr>
+        <p:cNvPr id="1" name=""/>
+        <p:cNvGrpSpPr/>
+        <p:nvPr/>
+      </p:nvGrpSpPr>
+      <p:grpSpPr>
+        <a:xfrm>
+          <a:off x="0" y="0"/>
+          <a:ext cx="0" cy="0"/>
+          <a:chOff x="0" y="0"/>
+          <a:chExt cx="0" cy="0"/>
+        </a:xfrm>
+      </p:grpSpPr>
+      <p:sp>
+        <p:nvSpPr>
+          <p:cNvPr id="3" name="Espace réservé du contenu 2">
+            <a:extLst>
+              <a:ext uri="{FF2B5EF4-FFF2-40B4-BE49-F238E27FC236}">
+                <a16:creationId xmlns:a16="http://schemas.microsoft.com/office/drawing/2014/main" id="{483B8BF8-EC2B-FBF2-6E50-0B1D17D14A7F}"/>
+              </a:ext>
+            </a:extLst>
+          </p:cNvPr>
+          <p:cNvSpPr>
+            <a:spLocks noGrp="1"/>
+          </p:cNvSpPr>
+          <p:nvPr>
+            <p:ph idx="1"/>
+          </p:nvPr>
+        </p:nvSpPr>
+        <p:spPr>
+          <a:xfrm>
+            <a:off x="767178" y="396320"/>
+            <a:ext cx="10515600" cy="4351338"/>
+          </a:xfrm>
+        </p:spPr>
+        <p:txBody>
+          <a:bodyPr>
+            <a:normAutofit/>
+          </a:bodyPr>
+          <a:lstStyle/>
+          <a:p>
+            <a:r>
+              <a:rPr lang="fr-FR" sz="1600" u="sng" dirty="0"/>
+              <a:t>Class Deck :</a:t>
+            </a:r>
+          </a:p>
+          <a:p>
+            <a:pPr marL="0" indent="0">
+              <a:buNone/>
+            </a:pPr>
+            <a:r>
+              <a:rPr lang="fr-FR" sz="1600" u="sng" dirty="0"/>
+              <a:t>Attributs :</a:t>
+            </a:r>
+          </a:p>
+          <a:p>
+            <a:pPr marL="0" indent="0">
+              <a:buNone/>
+            </a:pPr>
+            <a:r>
+              <a:rPr lang="fr-FR" sz="1600" dirty="0" err="1"/>
+              <a:t>self.deck</a:t>
+            </a:r>
+            <a:r>
+              <a:rPr lang="fr-FR" sz="1600" dirty="0"/>
+              <a:t> : </a:t>
+            </a:r>
+            <a:r>
+              <a:rPr lang="fr-FR" sz="1600" dirty="0" err="1"/>
+              <a:t>list</a:t>
+            </a:r>
+            <a:r>
+              <a:rPr lang="fr-FR" sz="1600" dirty="0"/>
+              <a:t>[</a:t>
+            </a:r>
+            <a:r>
+              <a:rPr lang="fr-FR" sz="1600" dirty="0" err="1"/>
+              <a:t>Card</a:t>
+            </a:r>
+            <a:r>
+              <a:rPr lang="fr-FR" sz="1600" dirty="0"/>
+              <a:t>]</a:t>
+            </a:r>
+          </a:p>
+          <a:p>
+            <a:pPr marL="0" indent="0">
+              <a:buNone/>
+            </a:pPr>
+            <a:endParaRPr lang="fr-FR" sz="1600" dirty="0"/>
+          </a:p>
+          <a:p>
+            <a:pPr marL="0" indent="0">
+              <a:buNone/>
+            </a:pPr>
+            <a:endParaRPr lang="fr-FR" sz="1600" dirty="0"/>
+          </a:p>
+          <a:p>
+            <a:pPr marL="0" indent="0">
+              <a:buNone/>
+            </a:pPr>
+            <a:r>
+              <a:rPr lang="fr-FR" sz="1600" u="sng" dirty="0" err="1"/>
+              <a:t>Methodes</a:t>
+            </a:r>
+            <a:r>
+              <a:rPr lang="fr-FR" sz="1600" u="sng" dirty="0"/>
+              <a:t> :</a:t>
+            </a:r>
+          </a:p>
+          <a:p>
+            <a:pPr marL="0" indent="0">
+              <a:buNone/>
+            </a:pPr>
+            <a:r>
+              <a:rPr lang="fr-FR" sz="1600" dirty="0"/>
+              <a:t>__init__()</a:t>
+            </a:r>
+          </a:p>
+          <a:p>
+            <a:pPr marL="0" indent="0">
+              <a:buNone/>
+            </a:pPr>
+            <a:r>
+              <a:rPr lang="fr-FR" sz="1600" dirty="0"/>
+              <a:t>__</a:t>
+            </a:r>
+            <a:r>
+              <a:rPr lang="fr-FR" sz="1600" dirty="0" err="1"/>
+              <a:t>str</a:t>
+            </a:r>
+            <a:r>
+              <a:rPr lang="fr-FR" sz="1600" dirty="0"/>
+              <a:t>__()</a:t>
+            </a:r>
+          </a:p>
+          <a:p>
+            <a:pPr marL="0" indent="0">
+              <a:buNone/>
+            </a:pPr>
+            <a:r>
+              <a:rPr lang="fr-FR" sz="1600" dirty="0" err="1"/>
+              <a:t>self.shuffle</a:t>
+            </a:r>
+            <a:r>
+              <a:rPr lang="fr-FR" sz="1600" dirty="0"/>
+              <a:t>()</a:t>
+            </a:r>
+          </a:p>
+          <a:p>
+            <a:pPr marL="0" indent="0">
+              <a:buNone/>
+            </a:pPr>
+            <a:r>
+              <a:rPr lang="fr-FR" sz="1600" dirty="0" err="1"/>
+              <a:t>self.draw</a:t>
+            </a:r>
+            <a:r>
+              <a:rPr lang="fr-FR" sz="1600" dirty="0"/>
+              <a:t>()</a:t>
+            </a:r>
+          </a:p>
+          <a:p>
+            <a:pPr marL="0" indent="0">
+              <a:buNone/>
+            </a:pPr>
+            <a:endParaRPr lang="fr-FR" sz="1600" u="sng" dirty="0"/>
+          </a:p>
+          <a:p>
+            <a:pPr marL="0" indent="0">
+              <a:buNone/>
+            </a:pPr>
+            <a:endParaRPr lang="fr-FR" sz="1600" u="sng" dirty="0"/>
+          </a:p>
+        </p:txBody>
+      </p:sp>
+    </p:spTree>
+    <p:extLst>
+      <p:ext uri="{BB962C8B-B14F-4D97-AF65-F5344CB8AC3E}">
+        <p14:creationId xmlns:p14="http://schemas.microsoft.com/office/powerpoint/2010/main" val="3462411619"/>
+      </p:ext>
+    </p:extLst>
+  </p:cSld>
+  <p:clrMapOvr>
+    <a:masterClrMapping/>
+  </p:clrMapOvr>
+</p:sld>
+</file>
+
+<file path=ppt/slides/slide6.xml><?xml version="1.0" encoding="utf-8"?>
+<p:sld xmlns:a="http://schemas.openxmlformats.org/drawingml/2006/main" xmlns:r="http://schemas.openxmlformats.org/officeDocument/2006/relationships" xmlns:p="http://schemas.openxmlformats.org/presentationml/2006/main">
+  <p:cSld>
+    <p:spTree>
+      <p:nvGrpSpPr>
+        <p:cNvPr id="1" name=""/>
+        <p:cNvGrpSpPr/>
+        <p:nvPr/>
+      </p:nvGrpSpPr>
+      <p:grpSpPr>
+        <a:xfrm>
+          <a:off x="0" y="0"/>
+          <a:ext cx="0" cy="0"/>
+          <a:chOff x="0" y="0"/>
+          <a:chExt cx="0" cy="0"/>
+        </a:xfrm>
+      </p:grpSpPr>
+      <p:sp>
+        <p:nvSpPr>
+          <p:cNvPr id="3" name="Espace réservé du contenu 2">
+            <a:extLst>
+              <a:ext uri="{FF2B5EF4-FFF2-40B4-BE49-F238E27FC236}">
+                <a16:creationId xmlns:a16="http://schemas.microsoft.com/office/drawing/2014/main" id="{3EA9A80A-D63D-B11D-F5DD-77DC9E69E1DB}"/>
+              </a:ext>
+            </a:extLst>
+          </p:cNvPr>
+          <p:cNvSpPr>
+            <a:spLocks noGrp="1"/>
+          </p:cNvSpPr>
+          <p:nvPr>
+            <p:ph idx="1"/>
+          </p:nvPr>
+        </p:nvSpPr>
+        <p:spPr>
+          <a:xfrm>
+            <a:off x="669524" y="591629"/>
+            <a:ext cx="10515600" cy="4351338"/>
+          </a:xfrm>
+        </p:spPr>
+        <p:txBody>
+          <a:bodyPr>
+            <a:normAutofit/>
+          </a:bodyPr>
+          <a:lstStyle/>
+          <a:p>
+            <a:r>
+              <a:rPr lang="fr-FR" sz="1600" u="sng" dirty="0"/>
+              <a:t>Fonctions</a:t>
+            </a:r>
+          </a:p>
+          <a:p>
+            <a:pPr marL="0" indent="0">
+              <a:buNone/>
+            </a:pPr>
+            <a:r>
+              <a:rPr lang="fr-FR" sz="1600" dirty="0"/>
+              <a:t>main() &gt; </a:t>
+            </a:r>
+            <a:r>
+              <a:rPr lang="fr-FR" sz="1600" dirty="0" err="1"/>
+              <a:t>void</a:t>
+            </a:r>
+            <a:endParaRPr lang="fr-FR" sz="1600" dirty="0"/>
+          </a:p>
+          <a:p>
+            <a:pPr marL="0" indent="0">
+              <a:buNone/>
+            </a:pPr>
+            <a:r>
+              <a:rPr lang="fr-FR" sz="1600" dirty="0" err="1"/>
+              <a:t>Is_lobby_full</a:t>
+            </a:r>
+            <a:r>
+              <a:rPr lang="fr-FR" sz="1600" dirty="0"/>
+              <a:t>() &gt; </a:t>
+            </a:r>
+            <a:r>
+              <a:rPr lang="fr-FR" sz="1600" dirty="0" err="1"/>
+              <a:t>bool</a:t>
+            </a:r>
+            <a:endParaRPr lang="fr-FR" sz="1600" dirty="0"/>
+          </a:p>
+          <a:p>
+            <a:pPr marL="0" indent="0">
+              <a:buNone/>
+            </a:pPr>
+            <a:r>
+              <a:rPr lang="fr-FR" sz="1600" dirty="0" err="1"/>
+              <a:t>separe_entete</a:t>
+            </a:r>
+            <a:r>
+              <a:rPr lang="fr-FR" sz="1600" dirty="0"/>
+              <a:t>(</a:t>
+            </a:r>
+            <a:r>
+              <a:rPr lang="fr-FR" sz="1600" dirty="0" err="1"/>
+              <a:t>packet</a:t>
+            </a:r>
+            <a:r>
+              <a:rPr lang="fr-FR" sz="1600" dirty="0"/>
+              <a:t> : </a:t>
+            </a:r>
+            <a:r>
+              <a:rPr lang="fr-FR" sz="1600" dirty="0" err="1"/>
+              <a:t>str</a:t>
+            </a:r>
+            <a:r>
+              <a:rPr lang="fr-FR" sz="1600" dirty="0"/>
+              <a:t>) &gt; tuple (</a:t>
+            </a:r>
+            <a:r>
+              <a:rPr lang="fr-FR" sz="1600" dirty="0" err="1"/>
+              <a:t>entete,args</a:t>
+            </a:r>
+            <a:r>
+              <a:rPr lang="fr-FR" sz="1600" dirty="0"/>
+              <a:t>)</a:t>
+            </a:r>
+          </a:p>
+          <a:p>
+            <a:pPr marL="0" indent="0">
+              <a:buNone/>
+            </a:pPr>
+            <a:r>
+              <a:rPr lang="fr-FR" sz="1600" dirty="0" err="1"/>
+              <a:t>start_game</a:t>
+            </a:r>
+            <a:r>
+              <a:rPr lang="fr-FR" sz="1600" dirty="0"/>
+              <a:t>(</a:t>
+            </a:r>
+            <a:r>
+              <a:rPr lang="fr-FR" sz="1600" dirty="0" err="1"/>
+              <a:t>players</a:t>
+            </a:r>
+            <a:r>
+              <a:rPr lang="fr-FR" sz="1600" dirty="0"/>
+              <a:t> : </a:t>
+            </a:r>
+            <a:r>
+              <a:rPr lang="fr-FR" sz="1600" dirty="0" err="1"/>
+              <a:t>list</a:t>
+            </a:r>
+            <a:r>
+              <a:rPr lang="fr-FR" sz="1600" dirty="0"/>
+              <a:t>) &gt; </a:t>
+            </a:r>
+            <a:r>
+              <a:rPr lang="fr-FR" sz="1600" dirty="0" err="1"/>
+              <a:t>void</a:t>
+            </a:r>
+            <a:endParaRPr lang="fr-FR" sz="1600" dirty="0"/>
+          </a:p>
+          <a:p>
+            <a:pPr marL="0" indent="0">
+              <a:buNone/>
+            </a:pPr>
+            <a:r>
+              <a:rPr lang="fr-FR" sz="1600" dirty="0" err="1"/>
+              <a:t>send_packet</a:t>
+            </a:r>
+            <a:r>
+              <a:rPr lang="fr-FR" sz="1600" dirty="0"/>
+              <a:t>()</a:t>
+            </a:r>
+          </a:p>
+        </p:txBody>
+      </p:sp>
+    </p:spTree>
+    <p:extLst>
+      <p:ext uri="{BB962C8B-B14F-4D97-AF65-F5344CB8AC3E}">
+        <p14:creationId xmlns:p14="http://schemas.microsoft.com/office/powerpoint/2010/main" val="2104535492"/>
       </p:ext>
     </p:extLst>
   </p:cSld>

</xml_diff>